<commit_message>
updated notebook and ppt
Updated notebook with collaborator names. Update power point with updated visualization screen shots.
</commit_message>
<xml_diff>
--- a/clinicaltrials_analysis.pptx
+++ b/clinicaltrials_analysis.pptx
@@ -211,7 +211,7 @@
           <a:p>
             <a:fld id="{366FF626-7C24-7D40-B09E-C156C2A85DA7}" type="datetimeFigureOut">
               <a:rPr lang="en-US" smtClean="0"/>
-              <a:t>5/6/18</a:t>
+              <a:t>5/12/18</a:t>
             </a:fld>
             <a:endParaRPr lang="en-US"/>
           </a:p>
@@ -777,7 +777,7 @@
           <a:p>
             <a:fld id="{1160EA64-D806-43AC-9DF2-F8C432F32B4C}" type="datetimeFigureOut">
               <a:rPr lang="en-US" smtClean="0"/>
-              <a:t>5/6/18</a:t>
+              <a:t>5/12/18</a:t>
             </a:fld>
             <a:endParaRPr lang="en-US" dirty="0"/>
           </a:p>
@@ -948,7 +948,7 @@
           <a:p>
             <a:fld id="{E9F9C37B-1D36-470B-8223-D6C91242EC14}" type="datetimeFigureOut">
               <a:rPr lang="en-US" smtClean="0"/>
-              <a:t>5/6/18</a:t>
+              <a:t>5/12/18</a:t>
             </a:fld>
             <a:endParaRPr lang="en-US" dirty="0"/>
           </a:p>
@@ -1128,7 +1128,7 @@
           <a:p>
             <a:fld id="{67C6F52A-A82B-47A2-A83A-8C4C91F2D59F}" type="datetimeFigureOut">
               <a:rPr lang="en-US" smtClean="0"/>
-              <a:t>5/6/18</a:t>
+              <a:t>5/12/18</a:t>
             </a:fld>
             <a:endParaRPr lang="en-US" dirty="0"/>
           </a:p>
@@ -1298,7 +1298,7 @@
           <a:p>
             <a:fld id="{F070A7B3-6521-4DCA-87E5-044747A908C1}" type="datetimeFigureOut">
               <a:rPr lang="en-US" smtClean="0"/>
-              <a:t>5/6/18</a:t>
+              <a:t>5/12/18</a:t>
             </a:fld>
             <a:endParaRPr lang="en-US" dirty="0"/>
           </a:p>
@@ -1559,7 +1559,7 @@
           <a:p>
             <a:fld id="{1160EA64-D806-43AC-9DF2-F8C432F32B4C}" type="datetimeFigureOut">
               <a:rPr lang="en-US" smtClean="0"/>
-              <a:t>5/6/18</a:t>
+              <a:t>5/12/18</a:t>
             </a:fld>
             <a:endParaRPr lang="en-US" dirty="0"/>
           </a:p>
@@ -1792,7 +1792,7 @@
           <a:p>
             <a:fld id="{AB134690-1557-4C89-A502-4959FE7FAD70}" type="datetimeFigureOut">
               <a:rPr lang="en-US" smtClean="0"/>
-              <a:t>5/6/18</a:t>
+              <a:t>5/12/18</a:t>
             </a:fld>
             <a:endParaRPr lang="en-US" dirty="0"/>
           </a:p>
@@ -2147,7 +2147,7 @@
           <a:p>
             <a:fld id="{4F7D4976-E339-4826-83B7-FBD03F55ECF8}" type="datetimeFigureOut">
               <a:rPr lang="en-US" smtClean="0"/>
-              <a:t>5/6/18</a:t>
+              <a:t>5/12/18</a:t>
             </a:fld>
             <a:endParaRPr lang="en-US" dirty="0"/>
           </a:p>
@@ -2288,7 +2288,7 @@
           <a:p>
             <a:fld id="{E1037C31-9E7A-4F99-8774-A0E530DE1A42}" type="datetimeFigureOut">
               <a:rPr lang="en-US" smtClean="0"/>
-              <a:t>5/6/18</a:t>
+              <a:t>5/12/18</a:t>
             </a:fld>
             <a:endParaRPr lang="en-US" dirty="0"/>
           </a:p>
@@ -2383,7 +2383,7 @@
           <a:p>
             <a:fld id="{C278504F-A551-4DE0-9316-4DCD1D8CC752}" type="datetimeFigureOut">
               <a:rPr lang="en-US" smtClean="0"/>
-              <a:t>5/6/18</a:t>
+              <a:t>5/12/18</a:t>
             </a:fld>
             <a:endParaRPr lang="en-US" dirty="0"/>
           </a:p>
@@ -2740,7 +2740,7 @@
           <a:p>
             <a:fld id="{D1BE4249-C0D0-4B06-8692-E8BB871AF643}" type="datetimeFigureOut">
               <a:rPr lang="en-US" smtClean="0"/>
-              <a:t>5/6/18</a:t>
+              <a:t>5/12/18</a:t>
             </a:fld>
             <a:endParaRPr lang="en-US" dirty="0"/>
           </a:p>
@@ -3058,7 +3058,7 @@
           <a:p>
             <a:fld id="{042B0DB6-F5C7-45FB-8CF3-31B45F9C2DAC}" type="datetimeFigureOut">
               <a:rPr lang="en-US" smtClean="0"/>
-              <a:t>5/6/18</a:t>
+              <a:t>5/12/18</a:t>
             </a:fld>
             <a:endParaRPr lang="en-US" dirty="0"/>
           </a:p>
@@ -3302,7 +3302,7 @@
           <a:p>
             <a:fld id="{1160EA64-D806-43AC-9DF2-F8C432F32B4C}" type="datetimeFigureOut">
               <a:rPr lang="en-US" smtClean="0"/>
-              <a:t>5/6/18</a:t>
+              <a:t>5/12/18</a:t>
             </a:fld>
             <a:endParaRPr lang="en-US" dirty="0"/>
           </a:p>
@@ -3998,10 +3998,10 @@
       </p:sp>
       <p:pic>
         <p:nvPicPr>
-          <p:cNvPr id="4" name="Picture 3" descr="code snippet with visualization" title="code snippet with visualization">
+          <p:cNvPr id="5" name="Picture 4" descr="graph of counts of ipd column" title="graph of counts of ipd column">
             <a:extLst>
               <a:ext uri="{FF2B5EF4-FFF2-40B4-BE49-F238E27FC236}">
-                <a16:creationId xmlns:a16="http://schemas.microsoft.com/office/drawing/2014/main" id="{B5FAE0D8-9AA3-F240-9601-121757C380BD}"/>
+                <a16:creationId xmlns:a16="http://schemas.microsoft.com/office/drawing/2014/main" id="{A8444A45-E54E-504B-96D3-AA667D606942}"/>
               </a:ext>
             </a:extLst>
           </p:cNvPr>
@@ -4018,17 +4018,12 @@
         </p:blipFill>
         <p:spPr>
           <a:xfrm>
-            <a:off x="464095" y="470881"/>
-            <a:ext cx="11331062" cy="5852160"/>
+            <a:off x="72279" y="457200"/>
+            <a:ext cx="12047442" cy="5943600"/>
           </a:xfrm>
           <a:prstGeom prst="rect">
             <a:avLst/>
           </a:prstGeom>
-          <a:ln w="12700">
-            <a:solidFill>
-              <a:schemeClr val="tx1"/>
-            </a:solidFill>
-          </a:ln>
         </p:spPr>
       </p:pic>
     </p:spTree>
@@ -4096,10 +4091,10 @@
       </p:sp>
       <p:pic>
         <p:nvPicPr>
-          <p:cNvPr id="4" name="Picture 3" descr="code snippet screen shot 4" title="code snippet screen shot 4">
+          <p:cNvPr id="5" name="Picture 4" descr="observations from the graph" title="observations from the graph">
             <a:extLst>
               <a:ext uri="{FF2B5EF4-FFF2-40B4-BE49-F238E27FC236}">
-                <a16:creationId xmlns:a16="http://schemas.microsoft.com/office/drawing/2014/main" id="{6205E71B-2D23-8546-BCBA-CBDF4611004A}"/>
+                <a16:creationId xmlns:a16="http://schemas.microsoft.com/office/drawing/2014/main" id="{C5286498-15DB-8240-84AF-DF2B405692D6}"/>
               </a:ext>
             </a:extLst>
           </p:cNvPr>
@@ -4116,17 +4111,12 @@
         </p:blipFill>
         <p:spPr>
           <a:xfrm>
-            <a:off x="0" y="1751856"/>
-            <a:ext cx="12192000" cy="3354287"/>
+            <a:off x="0" y="1123044"/>
+            <a:ext cx="12192000" cy="4611911"/>
           </a:xfrm>
           <a:prstGeom prst="rect">
             <a:avLst/>
           </a:prstGeom>
-          <a:ln w="12700">
-            <a:solidFill>
-              <a:schemeClr val="tx1"/>
-            </a:solidFill>
-          </a:ln>
         </p:spPr>
       </p:pic>
     </p:spTree>
@@ -5078,6 +5068,11 @@
             <a:off x="996575" y="3066335"/>
             <a:ext cx="10198851" cy="2834640"/>
           </a:xfrm>
+          <a:ln w="12700">
+            <a:solidFill>
+              <a:schemeClr val="tx1"/>
+            </a:solidFill>
+          </a:ln>
         </p:spPr>
       </p:pic>
     </p:spTree>
@@ -5166,6 +5161,11 @@
           <a:prstGeom prst="rect">
             <a:avLst/>
           </a:prstGeom>
+          <a:ln w="12700">
+            <a:solidFill>
+              <a:schemeClr val="tx1"/>
+            </a:solidFill>
+          </a:ln>
         </p:spPr>
       </p:pic>
     </p:spTree>

</xml_diff>